<commit_message>
text work. Fixed figures and normalized scalability and cache graphs
</commit_message>
<xml_diff>
--- a/paper/raw_data/mempod_figures.pptx
+++ b/paper/raw_data/mempod_figures.pptx
@@ -266,7 +266,7 @@
           <a:p>
             <a:fld id="{9AABD8A3-0D1A-42E1-BC2B-F49C43CA28F4}" type="datetimeFigureOut">
               <a:rPr lang="en-US" smtClean="0"/>
-              <a:t>4/9/2016</a:t>
+              <a:t>4/10/2016</a:t>
             </a:fld>
             <a:endParaRPr lang="en-US"/>
           </a:p>
@@ -436,7 +436,7 @@
           <a:p>
             <a:fld id="{9AABD8A3-0D1A-42E1-BC2B-F49C43CA28F4}" type="datetimeFigureOut">
               <a:rPr lang="en-US" smtClean="0"/>
-              <a:t>4/9/2016</a:t>
+              <a:t>4/10/2016</a:t>
             </a:fld>
             <a:endParaRPr lang="en-US"/>
           </a:p>
@@ -616,7 +616,7 @@
           <a:p>
             <a:fld id="{9AABD8A3-0D1A-42E1-BC2B-F49C43CA28F4}" type="datetimeFigureOut">
               <a:rPr lang="en-US" smtClean="0"/>
-              <a:t>4/9/2016</a:t>
+              <a:t>4/10/2016</a:t>
             </a:fld>
             <a:endParaRPr lang="en-US"/>
           </a:p>
@@ -786,7 +786,7 @@
           <a:p>
             <a:fld id="{9AABD8A3-0D1A-42E1-BC2B-F49C43CA28F4}" type="datetimeFigureOut">
               <a:rPr lang="en-US" smtClean="0"/>
-              <a:t>4/9/2016</a:t>
+              <a:t>4/10/2016</a:t>
             </a:fld>
             <a:endParaRPr lang="en-US"/>
           </a:p>
@@ -1032,7 +1032,7 @@
           <a:p>
             <a:fld id="{9AABD8A3-0D1A-42E1-BC2B-F49C43CA28F4}" type="datetimeFigureOut">
               <a:rPr lang="en-US" smtClean="0"/>
-              <a:t>4/9/2016</a:t>
+              <a:t>4/10/2016</a:t>
             </a:fld>
             <a:endParaRPr lang="en-US"/>
           </a:p>
@@ -1264,7 +1264,7 @@
           <a:p>
             <a:fld id="{9AABD8A3-0D1A-42E1-BC2B-F49C43CA28F4}" type="datetimeFigureOut">
               <a:rPr lang="en-US" smtClean="0"/>
-              <a:t>4/9/2016</a:t>
+              <a:t>4/10/2016</a:t>
             </a:fld>
             <a:endParaRPr lang="en-US"/>
           </a:p>
@@ -1631,7 +1631,7 @@
           <a:p>
             <a:fld id="{9AABD8A3-0D1A-42E1-BC2B-F49C43CA28F4}" type="datetimeFigureOut">
               <a:rPr lang="en-US" smtClean="0"/>
-              <a:t>4/9/2016</a:t>
+              <a:t>4/10/2016</a:t>
             </a:fld>
             <a:endParaRPr lang="en-US"/>
           </a:p>
@@ -1749,7 +1749,7 @@
           <a:p>
             <a:fld id="{9AABD8A3-0D1A-42E1-BC2B-F49C43CA28F4}" type="datetimeFigureOut">
               <a:rPr lang="en-US" smtClean="0"/>
-              <a:t>4/9/2016</a:t>
+              <a:t>4/10/2016</a:t>
             </a:fld>
             <a:endParaRPr lang="en-US"/>
           </a:p>
@@ -1844,7 +1844,7 @@
           <a:p>
             <a:fld id="{9AABD8A3-0D1A-42E1-BC2B-F49C43CA28F4}" type="datetimeFigureOut">
               <a:rPr lang="en-US" smtClean="0"/>
-              <a:t>4/9/2016</a:t>
+              <a:t>4/10/2016</a:t>
             </a:fld>
             <a:endParaRPr lang="en-US"/>
           </a:p>
@@ -2121,7 +2121,7 @@
           <a:p>
             <a:fld id="{9AABD8A3-0D1A-42E1-BC2B-F49C43CA28F4}" type="datetimeFigureOut">
               <a:rPr lang="en-US" smtClean="0"/>
-              <a:t>4/9/2016</a:t>
+              <a:t>4/10/2016</a:t>
             </a:fld>
             <a:endParaRPr lang="en-US"/>
           </a:p>
@@ -2374,7 +2374,7 @@
           <a:p>
             <a:fld id="{9AABD8A3-0D1A-42E1-BC2B-F49C43CA28F4}" type="datetimeFigureOut">
               <a:rPr lang="en-US" smtClean="0"/>
-              <a:t>4/9/2016</a:t>
+              <a:t>4/10/2016</a:t>
             </a:fld>
             <a:endParaRPr lang="en-US"/>
           </a:p>
@@ -2587,7 +2587,7 @@
           <a:p>
             <a:fld id="{9AABD8A3-0D1A-42E1-BC2B-F49C43CA28F4}" type="datetimeFigureOut">
               <a:rPr lang="en-US" smtClean="0"/>
-              <a:t>4/9/2016</a:t>
+              <a:t>4/10/2016</a:t>
             </a:fld>
             <a:endParaRPr lang="en-US"/>
           </a:p>
@@ -11183,8 +11183,8 @@
         </p:nvCxnSpPr>
         <p:spPr>
           <a:xfrm>
-            <a:off x="1282009" y="2484720"/>
-            <a:ext cx="1193380" cy="0"/>
+            <a:off x="1614616" y="2484720"/>
+            <a:ext cx="860773" cy="0"/>
           </a:xfrm>
           <a:prstGeom prst="straightConnector1">
             <a:avLst/>
@@ -11491,7 +11491,7 @@
         </p:nvSpPr>
         <p:spPr>
           <a:xfrm>
-            <a:off x="1282009" y="2236910"/>
+            <a:off x="1458493" y="2253669"/>
             <a:ext cx="960485" cy="261610"/>
           </a:xfrm>
           <a:prstGeom prst="rect">
@@ -11776,6 +11776,237 @@
           </a:p>
         </p:txBody>
       </p:sp>
+      <p:cxnSp>
+        <p:nvCxnSpPr>
+          <p:cNvPr id="28" name="Straight Arrow Connector 27"/>
+          <p:cNvCxnSpPr/>
+          <p:nvPr/>
+        </p:nvCxnSpPr>
+        <p:spPr>
+          <a:xfrm flipV="1">
+            <a:off x="7338628" y="2692364"/>
+            <a:ext cx="262113" cy="1"/>
+          </a:xfrm>
+          <a:prstGeom prst="straightConnector1">
+            <a:avLst/>
+          </a:prstGeom>
+          <a:ln w="25400">
+            <a:solidFill>
+              <a:schemeClr val="tx1"/>
+            </a:solidFill>
+            <a:tailEnd type="triangle"/>
+          </a:ln>
+        </p:spPr>
+        <p:style>
+          <a:lnRef idx="1">
+            <a:schemeClr val="accent1"/>
+          </a:lnRef>
+          <a:fillRef idx="0">
+            <a:schemeClr val="accent1"/>
+          </a:fillRef>
+          <a:effectRef idx="0">
+            <a:schemeClr val="accent1"/>
+          </a:effectRef>
+          <a:fontRef idx="minor">
+            <a:schemeClr val="tx1"/>
+          </a:fontRef>
+        </p:style>
+      </p:cxnSp>
+      <p:cxnSp>
+        <p:nvCxnSpPr>
+          <p:cNvPr id="29" name="Straight Arrow Connector 28"/>
+          <p:cNvCxnSpPr/>
+          <p:nvPr/>
+        </p:nvCxnSpPr>
+        <p:spPr>
+          <a:xfrm>
+            <a:off x="7338628" y="2235165"/>
+            <a:ext cx="262114" cy="0"/>
+          </a:xfrm>
+          <a:prstGeom prst="straightConnector1">
+            <a:avLst/>
+          </a:prstGeom>
+          <a:ln w="25400">
+            <a:solidFill>
+              <a:schemeClr val="tx1"/>
+            </a:solidFill>
+            <a:tailEnd type="triangle"/>
+          </a:ln>
+        </p:spPr>
+        <p:style>
+          <a:lnRef idx="1">
+            <a:schemeClr val="accent1"/>
+          </a:lnRef>
+          <a:fillRef idx="0">
+            <a:schemeClr val="accent1"/>
+          </a:fillRef>
+          <a:effectRef idx="0">
+            <a:schemeClr val="accent1"/>
+          </a:effectRef>
+          <a:fontRef idx="minor">
+            <a:schemeClr val="tx1"/>
+          </a:fontRef>
+        </p:style>
+      </p:cxnSp>
+      <p:cxnSp>
+        <p:nvCxnSpPr>
+          <p:cNvPr id="30" name="Straight Arrow Connector 29"/>
+          <p:cNvCxnSpPr/>
+          <p:nvPr/>
+        </p:nvCxnSpPr>
+        <p:spPr>
+          <a:xfrm>
+            <a:off x="7338628" y="3149565"/>
+            <a:ext cx="262113" cy="0"/>
+          </a:xfrm>
+          <a:prstGeom prst="straightConnector1">
+            <a:avLst/>
+          </a:prstGeom>
+          <a:ln w="25400">
+            <a:solidFill>
+              <a:schemeClr val="tx1"/>
+            </a:solidFill>
+            <a:tailEnd type="triangle"/>
+          </a:ln>
+        </p:spPr>
+        <p:style>
+          <a:lnRef idx="1">
+            <a:schemeClr val="accent1"/>
+          </a:lnRef>
+          <a:fillRef idx="0">
+            <a:schemeClr val="accent1"/>
+          </a:fillRef>
+          <a:effectRef idx="0">
+            <a:schemeClr val="accent1"/>
+          </a:effectRef>
+          <a:fontRef idx="minor">
+            <a:schemeClr val="tx1"/>
+          </a:fontRef>
+        </p:style>
+      </p:cxnSp>
+      <p:sp>
+        <p:nvSpPr>
+          <p:cNvPr id="31" name="TextBox 30"/>
+          <p:cNvSpPr txBox="1"/>
+          <p:nvPr/>
+        </p:nvSpPr>
+        <p:spPr>
+          <a:xfrm>
+            <a:off x="7082398" y="3678973"/>
+            <a:ext cx="960485" cy="430887"/>
+          </a:xfrm>
+          <a:prstGeom prst="rect">
+            <a:avLst/>
+          </a:prstGeom>
+          <a:noFill/>
+        </p:spPr>
+        <p:txBody>
+          <a:bodyPr wrap="square" rtlCol="0">
+            <a:spAutoFit/>
+          </a:bodyPr>
+          <a:lstStyle/>
+          <a:p>
+            <a:pPr algn="ctr"/>
+            <a:r>
+              <a:rPr lang="en-US" sz="1100" b="1" dirty="0" smtClean="0"/>
+              <a:t>Response </a:t>
+            </a:r>
+          </a:p>
+          <a:p>
+            <a:pPr algn="ctr"/>
+            <a:r>
+              <a:rPr lang="en-US" sz="1100" b="1" dirty="0" smtClean="0"/>
+              <a:t>to LLC</a:t>
+            </a:r>
+            <a:endParaRPr lang="en-US" sz="1100" b="1" dirty="0"/>
+          </a:p>
+        </p:txBody>
+      </p:sp>
+      <p:sp>
+        <p:nvSpPr>
+          <p:cNvPr id="6" name="Oval 5"/>
+          <p:cNvSpPr/>
+          <p:nvPr/>
+        </p:nvSpPr>
+        <p:spPr>
+          <a:xfrm>
+            <a:off x="7412534" y="2062172"/>
+            <a:ext cx="293191" cy="1267172"/>
+          </a:xfrm>
+          <a:prstGeom prst="ellipse">
+            <a:avLst/>
+          </a:prstGeom>
+          <a:noFill/>
+          <a:ln w="25400">
+            <a:solidFill>
+              <a:schemeClr val="tx1"/>
+            </a:solidFill>
+            <a:prstDash val="sysDash"/>
+          </a:ln>
+        </p:spPr>
+        <p:style>
+          <a:lnRef idx="2">
+            <a:schemeClr val="accent1">
+              <a:shade val="50000"/>
+            </a:schemeClr>
+          </a:lnRef>
+          <a:fillRef idx="1">
+            <a:schemeClr val="accent1"/>
+          </a:fillRef>
+          <a:effectRef idx="0">
+            <a:schemeClr val="accent1"/>
+          </a:effectRef>
+          <a:fontRef idx="minor">
+            <a:schemeClr val="lt1"/>
+          </a:fontRef>
+        </p:style>
+        <p:txBody>
+          <a:bodyPr rtlCol="0" anchor="ctr"/>
+          <a:lstStyle/>
+          <a:p>
+            <a:pPr algn="ctr"/>
+            <a:endParaRPr lang="en-US"/>
+          </a:p>
+        </p:txBody>
+      </p:sp>
+      <p:cxnSp>
+        <p:nvCxnSpPr>
+          <p:cNvPr id="34" name="Straight Arrow Connector 33"/>
+          <p:cNvCxnSpPr>
+            <a:stCxn id="31" idx="0"/>
+          </p:cNvCxnSpPr>
+          <p:nvPr/>
+        </p:nvCxnSpPr>
+        <p:spPr>
+          <a:xfrm flipV="1">
+            <a:off x="7562641" y="3362325"/>
+            <a:ext cx="0" cy="316648"/>
+          </a:xfrm>
+          <a:prstGeom prst="straightConnector1">
+            <a:avLst/>
+          </a:prstGeom>
+          <a:ln w="25400">
+            <a:solidFill>
+              <a:schemeClr val="tx1"/>
+            </a:solidFill>
+            <a:tailEnd type="triangle"/>
+          </a:ln>
+        </p:spPr>
+        <p:style>
+          <a:lnRef idx="1">
+            <a:schemeClr val="accent1"/>
+          </a:lnRef>
+          <a:fillRef idx="0">
+            <a:schemeClr val="accent1"/>
+          </a:fillRef>
+          <a:effectRef idx="0">
+            <a:schemeClr val="accent1"/>
+          </a:effectRef>
+          <a:fontRef idx="minor">
+            <a:schemeClr val="tx1"/>
+          </a:fontRef>
+        </p:style>
+      </p:cxnSp>
     </p:spTree>
     <p:extLst>
       <p:ext uri="{BB962C8B-B14F-4D97-AF65-F5344CB8AC3E}">
@@ -13871,11 +14102,7 @@
           <a:p>
             <a:r>
               <a:rPr lang="en-US" dirty="0" smtClean="0"/>
-              <a:t>Pod Design </a:t>
-            </a:r>
-            <a:r>
-              <a:rPr lang="en-US" dirty="0" smtClean="0"/>
-              <a:t>– Migration v2</a:t>
+              <a:t>Pod Design – Migration v2</a:t>
             </a:r>
             <a:endParaRPr lang="en-US" dirty="0"/>
           </a:p>

</xml_diff>